<commit_message>
Implemented visual cues for viewer
</commit_message>
<xml_diff>
--- a/Behaviour Tree.pptx
+++ b/Behaviour Tree.pptx
@@ -368,7 +368,7 @@
           <a:p>
             <a:fld id="{9184DA70-C731-4C70-880D-CCD4705E623C}" type="datetime1">
               <a:rPr lang="en-US" smtClean="0"/>
-              <a:t>3/26/2021</a:t>
+              <a:t>3/31/2021</a:t>
             </a:fld>
             <a:endParaRPr lang="en-US" dirty="0"/>
           </a:p>
@@ -556,7 +556,7 @@
           <a:p>
             <a:fld id="{4BE1D723-8F53-4F53-90B0-1982A396982E}" type="datetime1">
               <a:rPr lang="en-US" smtClean="0"/>
-              <a:t>3/26/2021</a:t>
+              <a:t>3/31/2021</a:t>
             </a:fld>
             <a:endParaRPr lang="en-US" dirty="0"/>
           </a:p>
@@ -929,7 +929,7 @@
           <a:p>
             <a:fld id="{97669AF7-7BEB-44E4-9852-375E34362B5B}" type="datetime1">
               <a:rPr lang="en-US" smtClean="0"/>
-              <a:t>3/26/2021</a:t>
+              <a:t>3/31/2021</a:t>
             </a:fld>
             <a:endParaRPr lang="en-US" dirty="0"/>
           </a:p>
@@ -1184,7 +1184,7 @@
           <a:p>
             <a:fld id="{BAAAC38D-0552-4C82-B593-E6124DFADBE2}" type="datetime1">
               <a:rPr lang="en-US" smtClean="0"/>
-              <a:t>3/26/2021</a:t>
+              <a:t>3/31/2021</a:t>
             </a:fld>
             <a:endParaRPr lang="en-US" dirty="0"/>
           </a:p>
@@ -1581,7 +1581,7 @@
           <a:p>
             <a:fld id="{D9DF0F1C-5577-4ACB-BB62-DF8F3C494C7E}" type="datetime1">
               <a:rPr lang="en-US" smtClean="0"/>
-              <a:t>3/26/2021</a:t>
+              <a:t>3/31/2021</a:t>
             </a:fld>
             <a:endParaRPr lang="en-US" dirty="0"/>
           </a:p>
@@ -1717,7 +1717,7 @@
           <a:p>
             <a:fld id="{1775B394-D9F9-4F0C-B15D-605F45CB9E9F}" type="datetime1">
               <a:rPr lang="en-US" smtClean="0"/>
-              <a:t>3/26/2021</a:t>
+              <a:t>3/31/2021</a:t>
             </a:fld>
             <a:endParaRPr lang="en-US" dirty="0"/>
           </a:p>
@@ -1874,7 +1874,7 @@
           <a:p>
             <a:fld id="{39667345-2558-425A-8533-9BFDBCE15005}" type="datetime1">
               <a:rPr lang="en-US" smtClean="0"/>
-              <a:t>3/26/2021</a:t>
+              <a:t>3/31/2021</a:t>
             </a:fld>
             <a:endParaRPr lang="en-US" dirty="0"/>
           </a:p>
@@ -2203,7 +2203,7 @@
           <a:p>
             <a:fld id="{92BEA474-078D-4E9B-9B14-09A87B19DC46}" type="datetime1">
               <a:rPr lang="en-US" smtClean="0"/>
-              <a:t>3/26/2021</a:t>
+              <a:t>3/31/2021</a:t>
             </a:fld>
             <a:endParaRPr lang="en-US" dirty="0"/>
           </a:p>
@@ -2553,7 +2553,7 @@
           <a:p>
             <a:fld id="{4907D986-8816-4272-A432-0437A28A9828}" type="datetime1">
               <a:rPr lang="en-US" smtClean="0"/>
-              <a:t>3/26/2021</a:t>
+              <a:t>3/31/2021</a:t>
             </a:fld>
             <a:endParaRPr lang="en-US" dirty="0"/>
           </a:p>
@@ -2814,7 +2814,7 @@
           <a:p>
             <a:fld id="{62D6E202-B606-4609-B914-27C9371A1F6D}" type="datetime1">
               <a:rPr lang="en-US" smtClean="0"/>
-              <a:t>3/26/2021</a:t>
+              <a:t>3/31/2021</a:t>
             </a:fld>
             <a:endParaRPr lang="en-US" dirty="0"/>
           </a:p>
@@ -7428,7 +7428,7 @@
         </p:nvSpPr>
         <p:spPr>
           <a:xfrm>
-            <a:off x="2048202" y="4621760"/>
+            <a:off x="4223098" y="4621760"/>
             <a:ext cx="1023538" cy="669579"/>
           </a:xfrm>
           <a:prstGeom prst="roundRect">
@@ -7489,7 +7489,7 @@
         </p:nvCxnSpPr>
         <p:spPr>
           <a:xfrm flipH="1">
-            <a:off x="2559971" y="4073506"/>
+            <a:off x="4734867" y="4073506"/>
             <a:ext cx="698019" cy="548254"/>
           </a:xfrm>
           <a:prstGeom prst="straightConnector1">
@@ -7528,7 +7528,7 @@
         </p:nvSpPr>
         <p:spPr>
           <a:xfrm>
-            <a:off x="6933708" y="3738716"/>
+            <a:off x="9108604" y="3738716"/>
             <a:ext cx="1023538" cy="669579"/>
           </a:xfrm>
           <a:prstGeom prst="roundRect">
@@ -7590,7 +7590,7 @@
         <p:spPr>
           <a:xfrm>
             <a:off x="6096000" y="2392188"/>
-            <a:ext cx="1349477" cy="1346528"/>
+            <a:ext cx="3524373" cy="1346528"/>
           </a:xfrm>
           <a:prstGeom prst="straightConnector1">
             <a:avLst/>
@@ -7628,7 +7628,7 @@
         </p:nvSpPr>
         <p:spPr>
           <a:xfrm>
-            <a:off x="4467778" y="4621761"/>
+            <a:off x="6642674" y="4621761"/>
             <a:ext cx="1023538" cy="669579"/>
           </a:xfrm>
           <a:prstGeom prst="roundRect">
@@ -7689,7 +7689,7 @@
         </p:nvCxnSpPr>
         <p:spPr>
           <a:xfrm>
-            <a:off x="4281528" y="4073506"/>
+            <a:off x="6456424" y="4073506"/>
             <a:ext cx="698019" cy="548255"/>
           </a:xfrm>
           <a:prstGeom prst="straightConnector1">
@@ -7728,7 +7728,7 @@
         </p:nvSpPr>
         <p:spPr>
           <a:xfrm>
-            <a:off x="3257990" y="3738716"/>
+            <a:off x="5432886" y="3738716"/>
             <a:ext cx="1023538" cy="669579"/>
           </a:xfrm>
           <a:prstGeom prst="roundRect">
@@ -7782,15 +7782,15 @@
           </p:cNvPr>
           <p:cNvCxnSpPr>
             <a:cxnSpLocks/>
-            <a:stCxn id="4" idx="1"/>
+            <a:stCxn id="4" idx="2"/>
             <a:endCxn id="107" idx="0"/>
           </p:cNvCxnSpPr>
           <p:nvPr/>
         </p:nvCxnSpPr>
         <p:spPr>
-          <a:xfrm flipH="1">
-            <a:off x="3769759" y="2392188"/>
-            <a:ext cx="1116873" cy="1346528"/>
+          <a:xfrm>
+            <a:off x="5491316" y="2784495"/>
+            <a:ext cx="453339" cy="954221"/>
           </a:xfrm>
           <a:prstGeom prst="straightConnector1">
             <a:avLst/>
@@ -7828,7 +7828,7 @@
         </p:nvSpPr>
         <p:spPr>
           <a:xfrm>
-            <a:off x="3257990" y="4621759"/>
+            <a:off x="5432886" y="4621759"/>
             <a:ext cx="1023538" cy="669579"/>
           </a:xfrm>
           <a:prstGeom prst="roundRect">
@@ -7889,7 +7889,7 @@
         </p:nvCxnSpPr>
         <p:spPr>
           <a:xfrm>
-            <a:off x="3769759" y="4408295"/>
+            <a:off x="5944655" y="4408295"/>
             <a:ext cx="0" cy="213464"/>
           </a:xfrm>
           <a:prstGeom prst="straightConnector1">
@@ -7928,7 +7928,7 @@
         </p:nvSpPr>
         <p:spPr>
           <a:xfrm>
-            <a:off x="5910170" y="4621758"/>
+            <a:off x="8085066" y="4621758"/>
             <a:ext cx="1023538" cy="669579"/>
           </a:xfrm>
           <a:prstGeom prst="roundRect">
@@ -7988,7 +7988,7 @@
         </p:nvCxnSpPr>
         <p:spPr>
           <a:xfrm flipH="1">
-            <a:off x="6421939" y="4073506"/>
+            <a:off x="8596835" y="4073506"/>
             <a:ext cx="511769" cy="548252"/>
           </a:xfrm>
           <a:prstGeom prst="straightConnector1">
@@ -8027,7 +8027,7 @@
         </p:nvSpPr>
         <p:spPr>
           <a:xfrm>
-            <a:off x="7957246" y="4623349"/>
+            <a:off x="10132142" y="4623349"/>
             <a:ext cx="1023538" cy="669579"/>
           </a:xfrm>
           <a:prstGeom prst="roundRect">
@@ -8087,8 +8087,207 @@
         </p:nvCxnSpPr>
         <p:spPr>
           <a:xfrm>
-            <a:off x="7957246" y="4073506"/>
+            <a:off x="10132142" y="4073506"/>
             <a:ext cx="511769" cy="549843"/>
+          </a:xfrm>
+          <a:prstGeom prst="straightConnector1">
+            <a:avLst/>
+          </a:prstGeom>
+          <a:ln>
+            <a:tailEnd type="triangle"/>
+          </a:ln>
+        </p:spPr>
+        <p:style>
+          <a:lnRef idx="1">
+            <a:schemeClr val="accent1"/>
+          </a:lnRef>
+          <a:fillRef idx="0">
+            <a:schemeClr val="accent1"/>
+          </a:fillRef>
+          <a:effectRef idx="0">
+            <a:schemeClr val="accent1"/>
+          </a:effectRef>
+          <a:fontRef idx="minor">
+            <a:schemeClr val="tx1"/>
+          </a:fontRef>
+        </p:style>
+      </p:cxnSp>
+      <p:sp>
+        <p:nvSpPr>
+          <p:cNvPr id="21" name="Rectangle: Rounded Corners 20">
+            <a:extLst>
+              <a:ext uri="{FF2B5EF4-FFF2-40B4-BE49-F238E27FC236}">
+                <a16:creationId xmlns:a16="http://schemas.microsoft.com/office/drawing/2014/main" id="{881F1C3D-461F-4AB5-8F66-83A1702A67E9}"/>
+              </a:ext>
+            </a:extLst>
+          </p:cNvPr>
+          <p:cNvSpPr/>
+          <p:nvPr/>
+        </p:nvSpPr>
+        <p:spPr>
+          <a:xfrm>
+            <a:off x="1466798" y="3738716"/>
+            <a:ext cx="1023538" cy="669579"/>
+          </a:xfrm>
+          <a:prstGeom prst="roundRect">
+            <a:avLst/>
+          </a:prstGeom>
+        </p:spPr>
+        <p:style>
+          <a:lnRef idx="2">
+            <a:schemeClr val="accent1">
+              <a:shade val="50000"/>
+            </a:schemeClr>
+          </a:lnRef>
+          <a:fillRef idx="1">
+            <a:schemeClr val="accent1"/>
+          </a:fillRef>
+          <a:effectRef idx="0">
+            <a:schemeClr val="accent1"/>
+          </a:effectRef>
+          <a:fontRef idx="minor">
+            <a:schemeClr val="lt1"/>
+          </a:fontRef>
+        </p:style>
+        <p:txBody>
+          <a:bodyPr rtlCol="0" anchor="ctr"/>
+          <a:lstStyle/>
+          <a:p>
+            <a:pPr algn="ctr"/>
+            <a:r>
+              <a:rPr lang="en-GB" sz="1000" dirty="0"/>
+              <a:t>Health Branch</a:t>
+            </a:r>
+            <a:br>
+              <a:rPr lang="en-GB" sz="1000" dirty="0"/>
+            </a:br>
+            <a:r>
+              <a:rPr lang="en-GB" sz="1000" dirty="0"/>
+              <a:t>[SELECTOR]</a:t>
+            </a:r>
+            <a:endParaRPr lang="en-FI" sz="1000" dirty="0"/>
+          </a:p>
+        </p:txBody>
+      </p:sp>
+      <p:cxnSp>
+        <p:nvCxnSpPr>
+          <p:cNvPr id="22" name="Straight Arrow Connector 21">
+            <a:extLst>
+              <a:ext uri="{FF2B5EF4-FFF2-40B4-BE49-F238E27FC236}">
+                <a16:creationId xmlns:a16="http://schemas.microsoft.com/office/drawing/2014/main" id="{FE3F496F-FAC4-4079-A97A-B633F646C40A}"/>
+              </a:ext>
+            </a:extLst>
+          </p:cNvPr>
+          <p:cNvCxnSpPr>
+            <a:cxnSpLocks/>
+            <a:stCxn id="21" idx="1"/>
+            <a:endCxn id="25" idx="0"/>
+          </p:cNvCxnSpPr>
+          <p:nvPr/>
+        </p:nvCxnSpPr>
+        <p:spPr>
+          <a:xfrm flipH="1">
+            <a:off x="952887" y="4073506"/>
+            <a:ext cx="513911" cy="548251"/>
+          </a:xfrm>
+          <a:prstGeom prst="straightConnector1">
+            <a:avLst/>
+          </a:prstGeom>
+          <a:ln>
+            <a:tailEnd type="triangle"/>
+          </a:ln>
+        </p:spPr>
+        <p:style>
+          <a:lnRef idx="1">
+            <a:schemeClr val="accent1"/>
+          </a:lnRef>
+          <a:fillRef idx="0">
+            <a:schemeClr val="accent1"/>
+          </a:fillRef>
+          <a:effectRef idx="0">
+            <a:schemeClr val="accent1"/>
+          </a:effectRef>
+          <a:fontRef idx="minor">
+            <a:schemeClr val="tx1"/>
+          </a:fontRef>
+        </p:style>
+      </p:cxnSp>
+      <p:sp>
+        <p:nvSpPr>
+          <p:cNvPr id="25" name="Rectangle: Rounded Corners 24">
+            <a:extLst>
+              <a:ext uri="{FF2B5EF4-FFF2-40B4-BE49-F238E27FC236}">
+                <a16:creationId xmlns:a16="http://schemas.microsoft.com/office/drawing/2014/main" id="{7A812EDB-2041-410B-906F-489A30CDAE03}"/>
+              </a:ext>
+            </a:extLst>
+          </p:cNvPr>
+          <p:cNvSpPr/>
+          <p:nvPr/>
+        </p:nvSpPr>
+        <p:spPr>
+          <a:xfrm>
+            <a:off x="441118" y="4621757"/>
+            <a:ext cx="1023538" cy="669579"/>
+          </a:xfrm>
+          <a:prstGeom prst="roundRect">
+            <a:avLst/>
+          </a:prstGeom>
+        </p:spPr>
+        <p:style>
+          <a:lnRef idx="2">
+            <a:schemeClr val="accent1">
+              <a:shade val="50000"/>
+            </a:schemeClr>
+          </a:lnRef>
+          <a:fillRef idx="1">
+            <a:schemeClr val="accent1"/>
+          </a:fillRef>
+          <a:effectRef idx="0">
+            <a:schemeClr val="accent1"/>
+          </a:effectRef>
+          <a:fontRef idx="minor">
+            <a:schemeClr val="lt1"/>
+          </a:fontRef>
+        </p:style>
+        <p:txBody>
+          <a:bodyPr rtlCol="0" anchor="ctr"/>
+          <a:lstStyle/>
+          <a:p>
+            <a:pPr algn="ctr"/>
+            <a:r>
+              <a:rPr lang="en-GB" sz="1000" dirty="0"/>
+              <a:t>Is Health Below 25%?</a:t>
+            </a:r>
+          </a:p>
+          <a:p>
+            <a:pPr algn="ctr"/>
+            <a:r>
+              <a:rPr lang="en-GB" sz="1000" dirty="0"/>
+              <a:t>[SEQUENCER]</a:t>
+            </a:r>
+            <a:endParaRPr lang="en-FI" sz="1000" dirty="0"/>
+          </a:p>
+        </p:txBody>
+      </p:sp>
+      <p:cxnSp>
+        <p:nvCxnSpPr>
+          <p:cNvPr id="14" name="Straight Arrow Connector 13">
+            <a:extLst>
+              <a:ext uri="{FF2B5EF4-FFF2-40B4-BE49-F238E27FC236}">
+                <a16:creationId xmlns:a16="http://schemas.microsoft.com/office/drawing/2014/main" id="{FD8D712F-D509-4A6E-8EAF-0F038602B245}"/>
+              </a:ext>
+            </a:extLst>
+          </p:cNvPr>
+          <p:cNvCxnSpPr>
+            <a:stCxn id="4" idx="1"/>
+            <a:endCxn id="21" idx="0"/>
+          </p:cNvCxnSpPr>
+          <p:nvPr/>
+        </p:nvCxnSpPr>
+        <p:spPr>
+          <a:xfrm flipH="1">
+            <a:off x="1978567" y="2392188"/>
+            <a:ext cx="2908065" cy="1346528"/>
           </a:xfrm>
           <a:prstGeom prst="straightConnector1">
             <a:avLst/>
@@ -9806,7 +10005,7 @@
         </p:nvSpPr>
         <p:spPr>
           <a:xfrm>
-            <a:off x="6617348" y="2032966"/>
+            <a:off x="5118324" y="2032966"/>
             <a:ext cx="1023538" cy="669579"/>
           </a:xfrm>
           <a:prstGeom prst="roundRect">
@@ -9863,7 +10062,7 @@
         </p:nvSpPr>
         <p:spPr>
           <a:xfrm>
-            <a:off x="6766408" y="2938949"/>
+            <a:off x="5267384" y="2938949"/>
             <a:ext cx="725417" cy="504396"/>
           </a:xfrm>
           <a:prstGeom prst="ellipse">
@@ -9917,7 +10116,7 @@
         </p:nvCxnSpPr>
         <p:spPr>
           <a:xfrm>
-            <a:off x="7129117" y="2702545"/>
+            <a:off x="5630093" y="2702545"/>
             <a:ext cx="0" cy="236404"/>
           </a:xfrm>
           <a:prstGeom prst="straightConnector1">
@@ -9956,7 +10155,7 @@
         </p:nvSpPr>
         <p:spPr>
           <a:xfrm>
-            <a:off x="6766408" y="3679749"/>
+            <a:off x="5267384" y="3679749"/>
             <a:ext cx="725417" cy="504396"/>
           </a:xfrm>
           <a:prstGeom prst="ellipse">
@@ -10010,7 +10209,7 @@
         </p:nvCxnSpPr>
         <p:spPr>
           <a:xfrm>
-            <a:off x="7129117" y="3443345"/>
+            <a:off x="5630093" y="3443345"/>
             <a:ext cx="0" cy="236404"/>
           </a:xfrm>
           <a:prstGeom prst="straightConnector1">
@@ -10049,7 +10248,7 @@
         </p:nvSpPr>
         <p:spPr>
           <a:xfrm>
-            <a:off x="6765794" y="4420549"/>
+            <a:off x="5266770" y="4420549"/>
             <a:ext cx="725417" cy="504396"/>
           </a:xfrm>
           <a:prstGeom prst="ellipse">
@@ -10103,7 +10302,7 @@
         </p:nvCxnSpPr>
         <p:spPr>
           <a:xfrm flipH="1">
-            <a:off x="7128503" y="4184145"/>
+            <a:off x="5629479" y="4184145"/>
             <a:ext cx="614" cy="236404"/>
           </a:xfrm>
           <a:prstGeom prst="straightConnector1">
@@ -10146,7 +10345,7 @@
         </p:nvCxnSpPr>
         <p:spPr>
           <a:xfrm rot="5400000" flipH="1">
-            <a:off x="7206645" y="4672747"/>
+            <a:off x="5707621" y="4672747"/>
             <a:ext cx="356662" cy="12700"/>
           </a:xfrm>
           <a:prstGeom prst="curvedConnector5">
@@ -10189,7 +10388,7 @@
         </p:nvSpPr>
         <p:spPr>
           <a:xfrm>
-            <a:off x="6765794" y="5161349"/>
+            <a:off x="5266770" y="5161349"/>
             <a:ext cx="725417" cy="504396"/>
           </a:xfrm>
           <a:prstGeom prst="ellipse">
@@ -10243,7 +10442,7 @@
         </p:nvCxnSpPr>
         <p:spPr>
           <a:xfrm>
-            <a:off x="7128503" y="4924945"/>
+            <a:off x="5629479" y="4924945"/>
             <a:ext cx="0" cy="236404"/>
           </a:xfrm>
           <a:prstGeom prst="straightConnector1">
@@ -10282,7 +10481,7 @@
         </p:nvSpPr>
         <p:spPr>
           <a:xfrm>
-            <a:off x="7853306" y="2032966"/>
+            <a:off x="6354282" y="2032966"/>
             <a:ext cx="1023538" cy="669579"/>
           </a:xfrm>
           <a:prstGeom prst="roundRect">
@@ -10339,7 +10538,7 @@
         </p:nvSpPr>
         <p:spPr>
           <a:xfrm>
-            <a:off x="8002366" y="2938949"/>
+            <a:off x="6503342" y="2938949"/>
             <a:ext cx="725417" cy="504396"/>
           </a:xfrm>
           <a:prstGeom prst="ellipse">
@@ -10393,7 +10592,7 @@
         </p:nvCxnSpPr>
         <p:spPr>
           <a:xfrm>
-            <a:off x="8365075" y="2702545"/>
+            <a:off x="6866051" y="2702545"/>
             <a:ext cx="0" cy="236404"/>
           </a:xfrm>
           <a:prstGeom prst="straightConnector1">
@@ -10432,7 +10631,7 @@
         </p:nvSpPr>
         <p:spPr>
           <a:xfrm>
-            <a:off x="8002366" y="3679749"/>
+            <a:off x="6503342" y="3679749"/>
             <a:ext cx="725417" cy="504396"/>
           </a:xfrm>
           <a:prstGeom prst="ellipse">
@@ -10486,7 +10685,7 @@
         </p:nvCxnSpPr>
         <p:spPr>
           <a:xfrm>
-            <a:off x="8365075" y="3443345"/>
+            <a:off x="6866051" y="3443345"/>
             <a:ext cx="0" cy="236404"/>
           </a:xfrm>
           <a:prstGeom prst="straightConnector1">
@@ -10525,7 +10724,7 @@
         </p:nvSpPr>
         <p:spPr>
           <a:xfrm>
-            <a:off x="8001752" y="4420549"/>
+            <a:off x="6502728" y="4420549"/>
             <a:ext cx="725417" cy="504396"/>
           </a:xfrm>
           <a:prstGeom prst="ellipse">
@@ -10579,7 +10778,7 @@
         </p:nvCxnSpPr>
         <p:spPr>
           <a:xfrm flipH="1">
-            <a:off x="8364461" y="4184145"/>
+            <a:off x="6865437" y="4184145"/>
             <a:ext cx="614" cy="236404"/>
           </a:xfrm>
           <a:prstGeom prst="straightConnector1">
@@ -10622,7 +10821,7 @@
         </p:nvCxnSpPr>
         <p:spPr>
           <a:xfrm rot="5400000" flipH="1">
-            <a:off x="8442603" y="4672747"/>
+            <a:off x="6943579" y="4672747"/>
             <a:ext cx="356662" cy="12700"/>
           </a:xfrm>
           <a:prstGeom prst="curvedConnector5">
@@ -10665,7 +10864,7 @@
         </p:nvSpPr>
         <p:spPr>
           <a:xfrm>
-            <a:off x="8001752" y="5161349"/>
+            <a:off x="6502728" y="5161349"/>
             <a:ext cx="725417" cy="504396"/>
           </a:xfrm>
           <a:prstGeom prst="ellipse">
@@ -10719,7 +10918,7 @@
         </p:nvCxnSpPr>
         <p:spPr>
           <a:xfrm>
-            <a:off x="8364461" y="4924945"/>
+            <a:off x="6865437" y="4924945"/>
             <a:ext cx="0" cy="236404"/>
           </a:xfrm>
           <a:prstGeom prst="straightConnector1">
@@ -10744,6 +10943,535 @@
           </a:fontRef>
         </p:style>
       </p:cxnSp>
+      <p:sp>
+        <p:nvSpPr>
+          <p:cNvPr id="67" name="Rectangle: Rounded Corners 66">
+            <a:extLst>
+              <a:ext uri="{FF2B5EF4-FFF2-40B4-BE49-F238E27FC236}">
+                <a16:creationId xmlns:a16="http://schemas.microsoft.com/office/drawing/2014/main" id="{8A2DC175-BD94-495A-94DB-1977E873840B}"/>
+              </a:ext>
+            </a:extLst>
+          </p:cNvPr>
+          <p:cNvSpPr/>
+          <p:nvPr/>
+        </p:nvSpPr>
+        <p:spPr>
+          <a:xfrm>
+            <a:off x="8954933" y="2032966"/>
+            <a:ext cx="1023538" cy="669579"/>
+          </a:xfrm>
+          <a:prstGeom prst="roundRect">
+            <a:avLst/>
+          </a:prstGeom>
+        </p:spPr>
+        <p:style>
+          <a:lnRef idx="2">
+            <a:schemeClr val="accent1">
+              <a:shade val="50000"/>
+            </a:schemeClr>
+          </a:lnRef>
+          <a:fillRef idx="1">
+            <a:schemeClr val="accent1"/>
+          </a:fillRef>
+          <a:effectRef idx="0">
+            <a:schemeClr val="accent1"/>
+          </a:effectRef>
+          <a:fontRef idx="minor">
+            <a:schemeClr val="lt1"/>
+          </a:fontRef>
+        </p:style>
+        <p:txBody>
+          <a:bodyPr rtlCol="0" anchor="ctr"/>
+          <a:lstStyle/>
+          <a:p>
+            <a:pPr algn="ctr"/>
+            <a:r>
+              <a:rPr lang="en-GB" sz="1000" dirty="0"/>
+              <a:t>Is Health Below 25%?</a:t>
+            </a:r>
+          </a:p>
+          <a:p>
+            <a:pPr algn="ctr"/>
+            <a:r>
+              <a:rPr lang="en-GB" sz="1000" dirty="0"/>
+              <a:t>[SEQUENCER]</a:t>
+            </a:r>
+            <a:endParaRPr lang="en-FI" sz="1000" dirty="0"/>
+          </a:p>
+        </p:txBody>
+      </p:sp>
+      <p:sp>
+        <p:nvSpPr>
+          <p:cNvPr id="68" name="Oval 67">
+            <a:extLst>
+              <a:ext uri="{FF2B5EF4-FFF2-40B4-BE49-F238E27FC236}">
+                <a16:creationId xmlns:a16="http://schemas.microsoft.com/office/drawing/2014/main" id="{907A3359-7963-4CB5-A6F2-AFDEFECC3387}"/>
+              </a:ext>
+            </a:extLst>
+          </p:cNvPr>
+          <p:cNvSpPr/>
+          <p:nvPr/>
+        </p:nvSpPr>
+        <p:spPr>
+          <a:xfrm>
+            <a:off x="9103993" y="2938949"/>
+            <a:ext cx="725417" cy="504396"/>
+          </a:xfrm>
+          <a:prstGeom prst="ellipse">
+            <a:avLst/>
+          </a:prstGeom>
+        </p:spPr>
+        <p:style>
+          <a:lnRef idx="2">
+            <a:schemeClr val="accent1">
+              <a:shade val="50000"/>
+            </a:schemeClr>
+          </a:lnRef>
+          <a:fillRef idx="1">
+            <a:schemeClr val="accent1"/>
+          </a:fillRef>
+          <a:effectRef idx="0">
+            <a:schemeClr val="accent1"/>
+          </a:effectRef>
+          <a:fontRef idx="minor">
+            <a:schemeClr val="lt1"/>
+          </a:fontRef>
+        </p:style>
+        <p:txBody>
+          <a:bodyPr rtlCol="0" anchor="ctr"/>
+          <a:lstStyle/>
+          <a:p>
+            <a:pPr algn="ctr"/>
+            <a:r>
+              <a:rPr lang="en-GB" sz="600" dirty="0"/>
+              <a:t>Is Health Above 25%?</a:t>
+            </a:r>
+            <a:endParaRPr lang="en-FI" sz="600" dirty="0"/>
+          </a:p>
+        </p:txBody>
+      </p:sp>
+      <p:cxnSp>
+        <p:nvCxnSpPr>
+          <p:cNvPr id="69" name="Straight Arrow Connector 68">
+            <a:extLst>
+              <a:ext uri="{FF2B5EF4-FFF2-40B4-BE49-F238E27FC236}">
+                <a16:creationId xmlns:a16="http://schemas.microsoft.com/office/drawing/2014/main" id="{CEE492D6-3905-4644-ADEE-9254B7AC454C}"/>
+              </a:ext>
+            </a:extLst>
+          </p:cNvPr>
+          <p:cNvCxnSpPr>
+            <a:cxnSpLocks/>
+            <a:stCxn id="67" idx="2"/>
+            <a:endCxn id="68" idx="0"/>
+          </p:cNvCxnSpPr>
+          <p:nvPr/>
+        </p:nvCxnSpPr>
+        <p:spPr>
+          <a:xfrm>
+            <a:off x="9466702" y="2702545"/>
+            <a:ext cx="0" cy="236404"/>
+          </a:xfrm>
+          <a:prstGeom prst="straightConnector1">
+            <a:avLst/>
+          </a:prstGeom>
+          <a:ln>
+            <a:tailEnd type="triangle"/>
+          </a:ln>
+        </p:spPr>
+        <p:style>
+          <a:lnRef idx="1">
+            <a:schemeClr val="accent1"/>
+          </a:lnRef>
+          <a:fillRef idx="0">
+            <a:schemeClr val="accent1"/>
+          </a:fillRef>
+          <a:effectRef idx="0">
+            <a:schemeClr val="accent1"/>
+          </a:effectRef>
+          <a:fontRef idx="minor">
+            <a:schemeClr val="tx1"/>
+          </a:fontRef>
+        </p:style>
+      </p:cxnSp>
+      <p:sp>
+        <p:nvSpPr>
+          <p:cNvPr id="70" name="Oval 69">
+            <a:extLst>
+              <a:ext uri="{FF2B5EF4-FFF2-40B4-BE49-F238E27FC236}">
+                <a16:creationId xmlns:a16="http://schemas.microsoft.com/office/drawing/2014/main" id="{2CCB865C-D6F7-4A0C-9306-F759D31AB04E}"/>
+              </a:ext>
+            </a:extLst>
+          </p:cNvPr>
+          <p:cNvSpPr/>
+          <p:nvPr/>
+        </p:nvSpPr>
+        <p:spPr>
+          <a:xfrm>
+            <a:off x="9103993" y="3679749"/>
+            <a:ext cx="725417" cy="504396"/>
+          </a:xfrm>
+          <a:prstGeom prst="ellipse">
+            <a:avLst/>
+          </a:prstGeom>
+        </p:spPr>
+        <p:style>
+          <a:lnRef idx="2">
+            <a:schemeClr val="accent1">
+              <a:shade val="50000"/>
+            </a:schemeClr>
+          </a:lnRef>
+          <a:fillRef idx="1">
+            <a:schemeClr val="accent1"/>
+          </a:fillRef>
+          <a:effectRef idx="0">
+            <a:schemeClr val="accent1"/>
+          </a:effectRef>
+          <a:fontRef idx="minor">
+            <a:schemeClr val="lt1"/>
+          </a:fontRef>
+        </p:style>
+        <p:txBody>
+          <a:bodyPr rtlCol="0" anchor="ctr"/>
+          <a:lstStyle/>
+          <a:p>
+            <a:pPr algn="ctr"/>
+            <a:r>
+              <a:rPr lang="en-GB" sz="600" dirty="0"/>
+              <a:t>Target Safe Area</a:t>
+            </a:r>
+            <a:endParaRPr lang="en-FI" sz="600" dirty="0"/>
+          </a:p>
+        </p:txBody>
+      </p:sp>
+      <p:cxnSp>
+        <p:nvCxnSpPr>
+          <p:cNvPr id="71" name="Straight Arrow Connector 70">
+            <a:extLst>
+              <a:ext uri="{FF2B5EF4-FFF2-40B4-BE49-F238E27FC236}">
+                <a16:creationId xmlns:a16="http://schemas.microsoft.com/office/drawing/2014/main" id="{20EDA96B-1D92-45BE-8227-A49C84E70665}"/>
+              </a:ext>
+            </a:extLst>
+          </p:cNvPr>
+          <p:cNvCxnSpPr>
+            <a:cxnSpLocks/>
+            <a:stCxn id="68" idx="4"/>
+            <a:endCxn id="70" idx="0"/>
+          </p:cNvCxnSpPr>
+          <p:nvPr/>
+        </p:nvCxnSpPr>
+        <p:spPr>
+          <a:xfrm>
+            <a:off x="9466702" y="3443345"/>
+            <a:ext cx="0" cy="236404"/>
+          </a:xfrm>
+          <a:prstGeom prst="straightConnector1">
+            <a:avLst/>
+          </a:prstGeom>
+          <a:ln>
+            <a:tailEnd type="triangle"/>
+          </a:ln>
+        </p:spPr>
+        <p:style>
+          <a:lnRef idx="1">
+            <a:schemeClr val="accent1"/>
+          </a:lnRef>
+          <a:fillRef idx="0">
+            <a:schemeClr val="accent1"/>
+          </a:fillRef>
+          <a:effectRef idx="0">
+            <a:schemeClr val="accent1"/>
+          </a:effectRef>
+          <a:fontRef idx="minor">
+            <a:schemeClr val="tx1"/>
+          </a:fontRef>
+        </p:style>
+      </p:cxnSp>
+      <p:sp>
+        <p:nvSpPr>
+          <p:cNvPr id="82" name="Oval 81">
+            <a:extLst>
+              <a:ext uri="{FF2B5EF4-FFF2-40B4-BE49-F238E27FC236}">
+                <a16:creationId xmlns:a16="http://schemas.microsoft.com/office/drawing/2014/main" id="{EF3CBCE6-6113-4DD7-9317-0604075D08AD}"/>
+              </a:ext>
+            </a:extLst>
+          </p:cNvPr>
+          <p:cNvSpPr/>
+          <p:nvPr/>
+        </p:nvSpPr>
+        <p:spPr>
+          <a:xfrm>
+            <a:off x="9103379" y="4420549"/>
+            <a:ext cx="725417" cy="504396"/>
+          </a:xfrm>
+          <a:prstGeom prst="ellipse">
+            <a:avLst/>
+          </a:prstGeom>
+        </p:spPr>
+        <p:style>
+          <a:lnRef idx="2">
+            <a:schemeClr val="accent1">
+              <a:shade val="50000"/>
+            </a:schemeClr>
+          </a:lnRef>
+          <a:fillRef idx="1">
+            <a:schemeClr val="accent1"/>
+          </a:fillRef>
+          <a:effectRef idx="0">
+            <a:schemeClr val="accent1"/>
+          </a:effectRef>
+          <a:fontRef idx="minor">
+            <a:schemeClr val="lt1"/>
+          </a:fontRef>
+        </p:style>
+        <p:txBody>
+          <a:bodyPr rtlCol="0" anchor="ctr"/>
+          <a:lstStyle/>
+          <a:p>
+            <a:pPr algn="ctr"/>
+            <a:r>
+              <a:rPr lang="en-GB" sz="600" dirty="0"/>
+              <a:t>Move Towards</a:t>
+            </a:r>
+            <a:endParaRPr lang="en-FI" sz="600" dirty="0"/>
+          </a:p>
+        </p:txBody>
+      </p:sp>
+      <p:cxnSp>
+        <p:nvCxnSpPr>
+          <p:cNvPr id="83" name="Straight Arrow Connector 82">
+            <a:extLst>
+              <a:ext uri="{FF2B5EF4-FFF2-40B4-BE49-F238E27FC236}">
+                <a16:creationId xmlns:a16="http://schemas.microsoft.com/office/drawing/2014/main" id="{C284A9D6-AEC1-4022-A190-5C6FC96AC53C}"/>
+              </a:ext>
+            </a:extLst>
+          </p:cNvPr>
+          <p:cNvCxnSpPr>
+            <a:cxnSpLocks/>
+            <a:stCxn id="70" idx="4"/>
+            <a:endCxn id="82" idx="0"/>
+          </p:cNvCxnSpPr>
+          <p:nvPr/>
+        </p:nvCxnSpPr>
+        <p:spPr>
+          <a:xfrm flipH="1">
+            <a:off x="9466088" y="4184145"/>
+            <a:ext cx="614" cy="236404"/>
+          </a:xfrm>
+          <a:prstGeom prst="straightConnector1">
+            <a:avLst/>
+          </a:prstGeom>
+          <a:ln>
+            <a:tailEnd type="triangle"/>
+          </a:ln>
+        </p:spPr>
+        <p:style>
+          <a:lnRef idx="1">
+            <a:schemeClr val="accent1"/>
+          </a:lnRef>
+          <a:fillRef idx="0">
+            <a:schemeClr val="accent1"/>
+          </a:fillRef>
+          <a:effectRef idx="0">
+            <a:schemeClr val="accent1"/>
+          </a:effectRef>
+          <a:fontRef idx="minor">
+            <a:schemeClr val="tx1"/>
+          </a:fontRef>
+        </p:style>
+      </p:cxnSp>
+      <p:cxnSp>
+        <p:nvCxnSpPr>
+          <p:cNvPr id="84" name="Connector: Curved 83">
+            <a:extLst>
+              <a:ext uri="{FF2B5EF4-FFF2-40B4-BE49-F238E27FC236}">
+                <a16:creationId xmlns:a16="http://schemas.microsoft.com/office/drawing/2014/main" id="{7FAB66D8-1AFA-48E2-987A-74D4FCB7D2D8}"/>
+              </a:ext>
+            </a:extLst>
+          </p:cNvPr>
+          <p:cNvCxnSpPr>
+            <a:cxnSpLocks/>
+            <a:stCxn id="82" idx="5"/>
+            <a:endCxn id="82" idx="7"/>
+          </p:cNvCxnSpPr>
+          <p:nvPr/>
+        </p:nvCxnSpPr>
+        <p:spPr>
+          <a:xfrm rot="5400000" flipH="1">
+            <a:off x="9544230" y="4672747"/>
+            <a:ext cx="356662" cy="12700"/>
+          </a:xfrm>
+          <a:prstGeom prst="curvedConnector5">
+            <a:avLst>
+              <a:gd name="adj1" fmla="val -20941"/>
+              <a:gd name="adj2" fmla="val -2211031"/>
+              <a:gd name="adj3" fmla="val 133633"/>
+            </a:avLst>
+          </a:prstGeom>
+          <a:ln>
+            <a:tailEnd type="triangle"/>
+          </a:ln>
+        </p:spPr>
+        <p:style>
+          <a:lnRef idx="1">
+            <a:schemeClr val="accent1"/>
+          </a:lnRef>
+          <a:fillRef idx="0">
+            <a:schemeClr val="accent1"/>
+          </a:fillRef>
+          <a:effectRef idx="0">
+            <a:schemeClr val="accent1"/>
+          </a:effectRef>
+          <a:fontRef idx="minor">
+            <a:schemeClr val="tx1"/>
+          </a:fontRef>
+        </p:style>
+      </p:cxnSp>
+      <p:sp>
+        <p:nvSpPr>
+          <p:cNvPr id="85" name="Oval 84">
+            <a:extLst>
+              <a:ext uri="{FF2B5EF4-FFF2-40B4-BE49-F238E27FC236}">
+                <a16:creationId xmlns:a16="http://schemas.microsoft.com/office/drawing/2014/main" id="{22B0611F-222B-4DC5-A105-7FC75C70849E}"/>
+              </a:ext>
+            </a:extLst>
+          </p:cNvPr>
+          <p:cNvSpPr/>
+          <p:nvPr/>
+        </p:nvSpPr>
+        <p:spPr>
+          <a:xfrm>
+            <a:off x="9103379" y="5161349"/>
+            <a:ext cx="725417" cy="504396"/>
+          </a:xfrm>
+          <a:prstGeom prst="ellipse">
+            <a:avLst/>
+          </a:prstGeom>
+        </p:spPr>
+        <p:style>
+          <a:lnRef idx="2">
+            <a:schemeClr val="accent1">
+              <a:shade val="50000"/>
+            </a:schemeClr>
+          </a:lnRef>
+          <a:fillRef idx="1">
+            <a:schemeClr val="accent1"/>
+          </a:fillRef>
+          <a:effectRef idx="0">
+            <a:schemeClr val="accent1"/>
+          </a:effectRef>
+          <a:fontRef idx="minor">
+            <a:schemeClr val="lt1"/>
+          </a:fontRef>
+        </p:style>
+        <p:txBody>
+          <a:bodyPr rtlCol="0" anchor="ctr"/>
+          <a:lstStyle/>
+          <a:p>
+            <a:pPr algn="ctr"/>
+            <a:r>
+              <a:rPr lang="en-GB" sz="600" dirty="0"/>
+              <a:t>Heal</a:t>
+            </a:r>
+            <a:endParaRPr lang="en-FI" sz="600" dirty="0"/>
+          </a:p>
+        </p:txBody>
+      </p:sp>
+      <p:cxnSp>
+        <p:nvCxnSpPr>
+          <p:cNvPr id="87" name="Straight Arrow Connector 86">
+            <a:extLst>
+              <a:ext uri="{FF2B5EF4-FFF2-40B4-BE49-F238E27FC236}">
+                <a16:creationId xmlns:a16="http://schemas.microsoft.com/office/drawing/2014/main" id="{6E42D716-7334-490F-9DA1-D610EA5EDA36}"/>
+              </a:ext>
+            </a:extLst>
+          </p:cNvPr>
+          <p:cNvCxnSpPr>
+            <a:cxnSpLocks/>
+            <a:stCxn id="82" idx="4"/>
+            <a:endCxn id="85" idx="0"/>
+          </p:cNvCxnSpPr>
+          <p:nvPr/>
+        </p:nvCxnSpPr>
+        <p:spPr>
+          <a:xfrm>
+            <a:off x="9466088" y="4924945"/>
+            <a:ext cx="0" cy="236404"/>
+          </a:xfrm>
+          <a:prstGeom prst="straightConnector1">
+            <a:avLst/>
+          </a:prstGeom>
+          <a:ln>
+            <a:tailEnd type="triangle"/>
+          </a:ln>
+        </p:spPr>
+        <p:style>
+          <a:lnRef idx="1">
+            <a:schemeClr val="accent1"/>
+          </a:lnRef>
+          <a:fillRef idx="0">
+            <a:schemeClr val="accent1"/>
+          </a:fillRef>
+          <a:effectRef idx="0">
+            <a:schemeClr val="accent1"/>
+          </a:effectRef>
+          <a:fontRef idx="minor">
+            <a:schemeClr val="tx1"/>
+          </a:fontRef>
+        </p:style>
+      </p:cxnSp>
+      <p:sp>
+        <p:nvSpPr>
+          <p:cNvPr id="19" name="Rectangle 18">
+            <a:extLst>
+              <a:ext uri="{FF2B5EF4-FFF2-40B4-BE49-F238E27FC236}">
+                <a16:creationId xmlns:a16="http://schemas.microsoft.com/office/drawing/2014/main" id="{579BFE22-0336-43D3-8DB3-E45489819A1C}"/>
+              </a:ext>
+            </a:extLst>
+          </p:cNvPr>
+          <p:cNvSpPr/>
+          <p:nvPr/>
+        </p:nvSpPr>
+        <p:spPr>
+          <a:xfrm>
+            <a:off x="9311484" y="3333383"/>
+            <a:ext cx="309206" cy="188336"/>
+          </a:xfrm>
+          <a:prstGeom prst="rect">
+            <a:avLst/>
+          </a:prstGeom>
+          <a:solidFill>
+            <a:srgbClr val="FFC000"/>
+          </a:solidFill>
+        </p:spPr>
+        <p:style>
+          <a:lnRef idx="2">
+            <a:schemeClr val="accent1">
+              <a:shade val="50000"/>
+            </a:schemeClr>
+          </a:lnRef>
+          <a:fillRef idx="1">
+            <a:schemeClr val="accent1"/>
+          </a:fillRef>
+          <a:effectRef idx="0">
+            <a:schemeClr val="accent1"/>
+          </a:effectRef>
+          <a:fontRef idx="minor">
+            <a:schemeClr val="lt1"/>
+          </a:fontRef>
+        </p:style>
+        <p:txBody>
+          <a:bodyPr rtlCol="0" anchor="ctr"/>
+          <a:lstStyle/>
+          <a:p>
+            <a:pPr algn="ctr"/>
+            <a:r>
+              <a:rPr lang="fi-FI" sz="400" dirty="0"/>
+              <a:t>Invert</a:t>
+            </a:r>
+            <a:endParaRPr lang="en-GB" sz="400" dirty="0"/>
+          </a:p>
+        </p:txBody>
+      </p:sp>
     </p:spTree>
     <p:extLst>
       <p:ext uri="{BB962C8B-B14F-4D97-AF65-F5344CB8AC3E}">
@@ -11704,6 +12432,15 @@
 </file>
 
 <file path=customXml/item2.xml><?xml version="1.0" encoding="utf-8"?>
+<p:properties xmlns:p="http://schemas.microsoft.com/office/2006/metadata/properties" xmlns:xsi="http://www.w3.org/2001/XMLSchema-instance" xmlns:pc="http://schemas.microsoft.com/office/infopath/2007/PartnerControls">
+  <documentManagement>
+    <Status xmlns="71af3243-3dd4-4a8d-8c0d-dd76da1f02a5">Not started</Status>
+    <MediaServiceKeyPoints xmlns="71af3243-3dd4-4a8d-8c0d-dd76da1f02a5" xsi:nil="true"/>
+  </documentManagement>
+</p:properties>
+</file>
+
+<file path=customXml/item3.xml><?xml version="1.0" encoding="utf-8"?>
 <ct:contentTypeSchema xmlns:ct="http://schemas.microsoft.com/office/2006/metadata/contentType" xmlns:ma="http://schemas.microsoft.com/office/2006/metadata/properties/metaAttributes" ct:_="" ma:_="" ma:contentTypeName="Document" ma:contentTypeID="0x01010079F111ED35F8CC479449609E8A0923A6" ma:contentTypeVersion="12" ma:contentTypeDescription="Create a new document." ma:contentTypeScope="" ma:versionID="a410dd7f93c95333ffa1b60ed6adedd1">
   <xsd:schema xmlns:xsd="http://www.w3.org/2001/XMLSchema" xmlns:xs="http://www.w3.org/2001/XMLSchema" xmlns:p="http://schemas.microsoft.com/office/2006/metadata/properties" xmlns:ns2="71af3243-3dd4-4a8d-8c0d-dd76da1f02a5" xmlns:ns3="16c05727-aa75-4e4a-9b5f-8a80a1165891" targetNamespace="http://schemas.microsoft.com/office/2006/metadata/properties" ma:root="true" ma:fieldsID="a936d9baba76aa3866493feff160faab" ns2:_="" ns3:_="">
     <xsd:import namespace="71af3243-3dd4-4a8d-8c0d-dd76da1f02a5"/>
@@ -11924,15 +12661,6 @@
 </ct:contentTypeSchema>
 </file>
 
-<file path=customXml/item3.xml><?xml version="1.0" encoding="utf-8"?>
-<p:properties xmlns:p="http://schemas.microsoft.com/office/2006/metadata/properties" xmlns:xsi="http://www.w3.org/2001/XMLSchema-instance" xmlns:pc="http://schemas.microsoft.com/office/infopath/2007/PartnerControls">
-  <documentManagement>
-    <Status xmlns="71af3243-3dd4-4a8d-8c0d-dd76da1f02a5">Not started</Status>
-    <MediaServiceKeyPoints xmlns="71af3243-3dd4-4a8d-8c0d-dd76da1f02a5" xsi:nil="true"/>
-  </documentManagement>
-</p:properties>
-</file>
-
 <file path=customXml/itemProps1.xml><?xml version="1.0" encoding="utf-8"?>
 <ds:datastoreItem xmlns:ds="http://schemas.openxmlformats.org/officeDocument/2006/customXml" ds:itemID="{638A3B04-B0F3-4C12-A722-52B5CF6D9723}">
   <ds:schemaRefs>
@@ -11942,6 +12670,16 @@
 </file>
 
 <file path=customXml/itemProps2.xml><?xml version="1.0" encoding="utf-8"?>
+<ds:datastoreItem xmlns:ds="http://schemas.openxmlformats.org/officeDocument/2006/customXml" ds:itemID="{4F5B1FD9-3BB6-4DA9-A089-3B68C2323D4F}">
+  <ds:schemaRefs>
+    <ds:schemaRef ds:uri="http://schemas.microsoft.com/office/2006/metadata/properties"/>
+    <ds:schemaRef ds:uri="http://schemas.microsoft.com/office/infopath/2007/PartnerControls"/>
+    <ds:schemaRef ds:uri="71af3243-3dd4-4a8d-8c0d-dd76da1f02a5"/>
+  </ds:schemaRefs>
+</ds:datastoreItem>
+</file>
+
+<file path=customXml/itemProps3.xml><?xml version="1.0" encoding="utf-8"?>
 <ds:datastoreItem xmlns:ds="http://schemas.openxmlformats.org/officeDocument/2006/customXml" ds:itemID="{1747A963-53E0-44AF-AF13-963FE676C682}">
   <ds:schemaRefs>
     <ds:schemaRef ds:uri="http://schemas.microsoft.com/office/2006/metadata/contentType"/>
@@ -11958,14 +12696,4 @@
     <ds:schemaRef ds:uri="http://schemas.microsoft.com/internal/obd"/>
   </ds:schemaRefs>
 </ds:datastoreItem>
-</file>
-
-<file path=customXml/itemProps3.xml><?xml version="1.0" encoding="utf-8"?>
-<ds:datastoreItem xmlns:ds="http://schemas.openxmlformats.org/officeDocument/2006/customXml" ds:itemID="{4F5B1FD9-3BB6-4DA9-A089-3B68C2323D4F}">
-  <ds:schemaRefs>
-    <ds:schemaRef ds:uri="http://schemas.microsoft.com/office/2006/metadata/properties"/>
-    <ds:schemaRef ds:uri="http://schemas.microsoft.com/office/infopath/2007/PartnerControls"/>
-    <ds:schemaRef ds:uri="71af3243-3dd4-4a8d-8c0d-dd76da1f02a5"/>
-  </ds:schemaRefs>
-</ds:datastoreItem>
 </file>
</xml_diff>

<commit_message>
Powerup Spawning, Small changes to Capture Collision logic
- Ball, Agent & Powerup Collision fixes
</commit_message>
<xml_diff>
--- a/Behaviour Tree.pptx
+++ b/Behaviour Tree.pptx
@@ -368,7 +368,7 @@
           <a:p>
             <a:fld id="{9184DA70-C731-4C70-880D-CCD4705E623C}" type="datetime1">
               <a:rPr lang="en-US" smtClean="0"/>
-              <a:t>3/31/2021</a:t>
+              <a:t>4/2/2021</a:t>
             </a:fld>
             <a:endParaRPr lang="en-US" dirty="0"/>
           </a:p>
@@ -556,7 +556,7 @@
           <a:p>
             <a:fld id="{4BE1D723-8F53-4F53-90B0-1982A396982E}" type="datetime1">
               <a:rPr lang="en-US" smtClean="0"/>
-              <a:t>3/31/2021</a:t>
+              <a:t>4/2/2021</a:t>
             </a:fld>
             <a:endParaRPr lang="en-US" dirty="0"/>
           </a:p>
@@ -929,7 +929,7 @@
           <a:p>
             <a:fld id="{97669AF7-7BEB-44E4-9852-375E34362B5B}" type="datetime1">
               <a:rPr lang="en-US" smtClean="0"/>
-              <a:t>3/31/2021</a:t>
+              <a:t>4/2/2021</a:t>
             </a:fld>
             <a:endParaRPr lang="en-US" dirty="0"/>
           </a:p>
@@ -1184,7 +1184,7 @@
           <a:p>
             <a:fld id="{BAAAC38D-0552-4C82-B593-E6124DFADBE2}" type="datetime1">
               <a:rPr lang="en-US" smtClean="0"/>
-              <a:t>3/31/2021</a:t>
+              <a:t>4/2/2021</a:t>
             </a:fld>
             <a:endParaRPr lang="en-US" dirty="0"/>
           </a:p>
@@ -1581,7 +1581,7 @@
           <a:p>
             <a:fld id="{D9DF0F1C-5577-4ACB-BB62-DF8F3C494C7E}" type="datetime1">
               <a:rPr lang="en-US" smtClean="0"/>
-              <a:t>3/31/2021</a:t>
+              <a:t>4/2/2021</a:t>
             </a:fld>
             <a:endParaRPr lang="en-US" dirty="0"/>
           </a:p>
@@ -1717,7 +1717,7 @@
           <a:p>
             <a:fld id="{1775B394-D9F9-4F0C-B15D-605F45CB9E9F}" type="datetime1">
               <a:rPr lang="en-US" smtClean="0"/>
-              <a:t>3/31/2021</a:t>
+              <a:t>4/2/2021</a:t>
             </a:fld>
             <a:endParaRPr lang="en-US" dirty="0"/>
           </a:p>
@@ -1874,7 +1874,7 @@
           <a:p>
             <a:fld id="{39667345-2558-425A-8533-9BFDBCE15005}" type="datetime1">
               <a:rPr lang="en-US" smtClean="0"/>
-              <a:t>3/31/2021</a:t>
+              <a:t>4/2/2021</a:t>
             </a:fld>
             <a:endParaRPr lang="en-US" dirty="0"/>
           </a:p>
@@ -2203,7 +2203,7 @@
           <a:p>
             <a:fld id="{92BEA474-078D-4E9B-9B14-09A87B19DC46}" type="datetime1">
               <a:rPr lang="en-US" smtClean="0"/>
-              <a:t>3/31/2021</a:t>
+              <a:t>4/2/2021</a:t>
             </a:fld>
             <a:endParaRPr lang="en-US" dirty="0"/>
           </a:p>
@@ -2553,7 +2553,7 @@
           <a:p>
             <a:fld id="{4907D986-8816-4272-A432-0437A28A9828}" type="datetime1">
               <a:rPr lang="en-US" smtClean="0"/>
-              <a:t>3/31/2021</a:t>
+              <a:t>4/2/2021</a:t>
             </a:fld>
             <a:endParaRPr lang="en-US" dirty="0"/>
           </a:p>
@@ -2814,7 +2814,7 @@
           <a:p>
             <a:fld id="{62D6E202-B606-4609-B914-27C9371A1F6D}" type="datetime1">
               <a:rPr lang="en-US" smtClean="0"/>
-              <a:t>3/31/2021</a:t>
+              <a:t>4/2/2021</a:t>
             </a:fld>
             <a:endParaRPr lang="en-US" dirty="0"/>
           </a:p>
@@ -7981,6 +7981,7 @@
             </a:extLst>
           </p:cNvPr>
           <p:cNvCxnSpPr>
+            <a:cxnSpLocks/>
             <a:stCxn id="9" idx="1"/>
             <a:endCxn id="78" idx="0"/>
           </p:cNvCxnSpPr>
@@ -8080,6 +8081,7 @@
             </a:extLst>
           </p:cNvPr>
           <p:cNvCxnSpPr>
+            <a:cxnSpLocks/>
             <a:stCxn id="9" idx="3"/>
             <a:endCxn id="81" idx="0"/>
           </p:cNvCxnSpPr>
@@ -10035,7 +10037,7 @@
             <a:pPr algn="ctr"/>
             <a:r>
               <a:rPr lang="en-GB" sz="1000" dirty="0"/>
-              <a:t>Is Powerup Speed?</a:t>
+              <a:t>Is Powerup Speed &amp; Active?</a:t>
             </a:r>
           </a:p>
           <a:p>
@@ -10511,8 +10513,20 @@
             <a:pPr algn="ctr"/>
             <a:r>
               <a:rPr lang="en-GB" sz="1000" dirty="0"/>
-              <a:t>Is Powerup Kick?</a:t>
-            </a:r>
+              <a:t>Is Powerup Kick </a:t>
+            </a:r>
+            <a:r>
+              <a:rPr lang="en-GB" sz="1000"/>
+              <a:t>&amp; </a:t>
+            </a:r>
+          </a:p>
+          <a:p>
+            <a:pPr algn="ctr"/>
+            <a:r>
+              <a:rPr lang="en-GB" sz="1000"/>
+              <a:t>Active?</a:t>
+            </a:r>
+            <a:endParaRPr lang="en-GB" sz="1000" dirty="0"/>
           </a:p>
           <a:p>
             <a:pPr algn="ctr"/>
@@ -12432,15 +12446,6 @@
 </file>
 
 <file path=customXml/item2.xml><?xml version="1.0" encoding="utf-8"?>
-<p:properties xmlns:p="http://schemas.microsoft.com/office/2006/metadata/properties" xmlns:xsi="http://www.w3.org/2001/XMLSchema-instance" xmlns:pc="http://schemas.microsoft.com/office/infopath/2007/PartnerControls">
-  <documentManagement>
-    <Status xmlns="71af3243-3dd4-4a8d-8c0d-dd76da1f02a5">Not started</Status>
-    <MediaServiceKeyPoints xmlns="71af3243-3dd4-4a8d-8c0d-dd76da1f02a5" xsi:nil="true"/>
-  </documentManagement>
-</p:properties>
-</file>
-
-<file path=customXml/item3.xml><?xml version="1.0" encoding="utf-8"?>
 <ct:contentTypeSchema xmlns:ct="http://schemas.microsoft.com/office/2006/metadata/contentType" xmlns:ma="http://schemas.microsoft.com/office/2006/metadata/properties/metaAttributes" ct:_="" ma:_="" ma:contentTypeName="Document" ma:contentTypeID="0x01010079F111ED35F8CC479449609E8A0923A6" ma:contentTypeVersion="12" ma:contentTypeDescription="Create a new document." ma:contentTypeScope="" ma:versionID="a410dd7f93c95333ffa1b60ed6adedd1">
   <xsd:schema xmlns:xsd="http://www.w3.org/2001/XMLSchema" xmlns:xs="http://www.w3.org/2001/XMLSchema" xmlns:p="http://schemas.microsoft.com/office/2006/metadata/properties" xmlns:ns2="71af3243-3dd4-4a8d-8c0d-dd76da1f02a5" xmlns:ns3="16c05727-aa75-4e4a-9b5f-8a80a1165891" targetNamespace="http://schemas.microsoft.com/office/2006/metadata/properties" ma:root="true" ma:fieldsID="a936d9baba76aa3866493feff160faab" ns2:_="" ns3:_="">
     <xsd:import namespace="71af3243-3dd4-4a8d-8c0d-dd76da1f02a5"/>
@@ -12661,6 +12666,15 @@
 </ct:contentTypeSchema>
 </file>
 
+<file path=customXml/item3.xml><?xml version="1.0" encoding="utf-8"?>
+<p:properties xmlns:p="http://schemas.microsoft.com/office/2006/metadata/properties" xmlns:xsi="http://www.w3.org/2001/XMLSchema-instance" xmlns:pc="http://schemas.microsoft.com/office/infopath/2007/PartnerControls">
+  <documentManagement>
+    <Status xmlns="71af3243-3dd4-4a8d-8c0d-dd76da1f02a5">Not started</Status>
+    <MediaServiceKeyPoints xmlns="71af3243-3dd4-4a8d-8c0d-dd76da1f02a5" xsi:nil="true"/>
+  </documentManagement>
+</p:properties>
+</file>
+
 <file path=customXml/itemProps1.xml><?xml version="1.0" encoding="utf-8"?>
 <ds:datastoreItem xmlns:ds="http://schemas.openxmlformats.org/officeDocument/2006/customXml" ds:itemID="{638A3B04-B0F3-4C12-A722-52B5CF6D9723}">
   <ds:schemaRefs>
@@ -12670,16 +12684,6 @@
 </file>
 
 <file path=customXml/itemProps2.xml><?xml version="1.0" encoding="utf-8"?>
-<ds:datastoreItem xmlns:ds="http://schemas.openxmlformats.org/officeDocument/2006/customXml" ds:itemID="{4F5B1FD9-3BB6-4DA9-A089-3B68C2323D4F}">
-  <ds:schemaRefs>
-    <ds:schemaRef ds:uri="http://schemas.microsoft.com/office/2006/metadata/properties"/>
-    <ds:schemaRef ds:uri="http://schemas.microsoft.com/office/infopath/2007/PartnerControls"/>
-    <ds:schemaRef ds:uri="71af3243-3dd4-4a8d-8c0d-dd76da1f02a5"/>
-  </ds:schemaRefs>
-</ds:datastoreItem>
-</file>
-
-<file path=customXml/itemProps3.xml><?xml version="1.0" encoding="utf-8"?>
 <ds:datastoreItem xmlns:ds="http://schemas.openxmlformats.org/officeDocument/2006/customXml" ds:itemID="{1747A963-53E0-44AF-AF13-963FE676C682}">
   <ds:schemaRefs>
     <ds:schemaRef ds:uri="http://schemas.microsoft.com/office/2006/metadata/contentType"/>
@@ -12696,4 +12700,14 @@
     <ds:schemaRef ds:uri="http://schemas.microsoft.com/internal/obd"/>
   </ds:schemaRefs>
 </ds:datastoreItem>
+</file>
+
+<file path=customXml/itemProps3.xml><?xml version="1.0" encoding="utf-8"?>
+<ds:datastoreItem xmlns:ds="http://schemas.openxmlformats.org/officeDocument/2006/customXml" ds:itemID="{4F5B1FD9-3BB6-4DA9-A089-3B68C2323D4F}">
+  <ds:schemaRefs>
+    <ds:schemaRef ds:uri="http://schemas.microsoft.com/office/2006/metadata/properties"/>
+    <ds:schemaRef ds:uri="http://schemas.microsoft.com/office/infopath/2007/PartnerControls"/>
+    <ds:schemaRef ds:uri="71af3243-3dd4-4a8d-8c0d-dd76da1f02a5"/>
+  </ds:schemaRefs>
+</ds:datastoreItem>
 </file>
</xml_diff>